<commit_message>
v4 add check frames
</commit_message>
<xml_diff>
--- a/Slides/intro_pictures.pptx
+++ b/Slides/intro_pictures.pptx
@@ -5,14 +5,13 @@
     <p:sldMasterId id="2147483648" r:id="rId1"/>
   </p:sldMasterIdLst>
   <p:notesMasterIdLst>
-    <p:notesMasterId r:id="rId7"/>
+    <p:notesMasterId r:id="rId6"/>
   </p:notesMasterIdLst>
   <p:sldIdLst>
-    <p:sldId id="271" r:id="rId2"/>
-    <p:sldId id="272" r:id="rId3"/>
-    <p:sldId id="265" r:id="rId4"/>
-    <p:sldId id="260" r:id="rId5"/>
-    <p:sldId id="263" r:id="rId6"/>
+    <p:sldId id="274" r:id="rId2"/>
+    <p:sldId id="265" r:id="rId3"/>
+    <p:sldId id="273" r:id="rId4"/>
+    <p:sldId id="263" r:id="rId5"/>
   </p:sldIdLst>
   <p:sldSz cx="12192000" cy="6858000"/>
   <p:notesSz cx="6858000" cy="9144000"/>
@@ -212,7 +211,7 @@
           <a:p>
             <a:fld id="{62EBF96C-8FE0-EB4B-944E-DE12FBCCAF62}" type="datetimeFigureOut">
               <a:rPr lang="en-US" smtClean="0"/>
-              <a:t>2/22/24</a:t>
+              <a:t>4/10/24</a:t>
             </a:fld>
             <a:endParaRPr lang="en-US"/>
           </a:p>
@@ -484,13 +483,7 @@
   <p:cSld>
     <p:spTree>
       <p:nvGrpSpPr>
-        <p:cNvPr id="1" name="">
-          <a:extLst>
-            <a:ext uri="{FF2B5EF4-FFF2-40B4-BE49-F238E27FC236}">
-              <a16:creationId xmlns:a16="http://schemas.microsoft.com/office/drawing/2014/main" id="{0595F2F2-9C52-B3AD-76B7-BF11E7A625AB}"/>
-            </a:ext>
-          </a:extLst>
-        </p:cNvPr>
+        <p:cNvPr id="1" name=""/>
         <p:cNvGrpSpPr/>
         <p:nvPr/>
       </p:nvGrpSpPr>
@@ -504,13 +497,7 @@
       </p:grpSpPr>
       <p:sp>
         <p:nvSpPr>
-          <p:cNvPr id="2" name="Slide Image Placeholder 1">
-            <a:extLst>
-              <a:ext uri="{FF2B5EF4-FFF2-40B4-BE49-F238E27FC236}">
-                <a16:creationId xmlns:a16="http://schemas.microsoft.com/office/drawing/2014/main" id="{782BE8CA-2A19-2DB5-3EB2-5D5281E9D692}"/>
-              </a:ext>
-            </a:extLst>
-          </p:cNvPr>
+          <p:cNvPr id="2" name="Slide Image Placeholder 1"/>
           <p:cNvSpPr>
             <a:spLocks noGrp="1" noRot="1" noChangeAspect="1"/>
           </p:cNvSpPr>
@@ -522,13 +509,7 @@
       </p:sp>
       <p:sp>
         <p:nvSpPr>
-          <p:cNvPr id="3" name="Notes Placeholder 2">
-            <a:extLst>
-              <a:ext uri="{FF2B5EF4-FFF2-40B4-BE49-F238E27FC236}">
-                <a16:creationId xmlns:a16="http://schemas.microsoft.com/office/drawing/2014/main" id="{DB37B011-0DC1-02C1-875B-9FF135124600}"/>
-              </a:ext>
-            </a:extLst>
-          </p:cNvPr>
+          <p:cNvPr id="3" name="Notes Placeholder 2"/>
           <p:cNvSpPr>
             <a:spLocks noGrp="1"/>
           </p:cNvSpPr>
@@ -559,14 +540,26 @@
               <a:defRPr/>
             </a:pPr>
             <a:r>
-              <a:rPr lang="en-US" sz="1800" kern="100" dirty="0">
+              <a:rPr lang="en-US" sz="1200" dirty="0">
                 <a:effectLst/>
                 <a:latin typeface="Calibri" panose="020F0502020204030204" pitchFamily="34" charset="0"/>
                 <a:ea typeface="Calibri" panose="020F0502020204030204" pitchFamily="34" charset="0"/>
                 <a:cs typeface="Times New Roman" panose="02020603050405020304" pitchFamily="18" charset="0"/>
               </a:rPr>
-              <a:t>To figure out what Wuggle will do next, you’ll have to use what you see in the picture. </a:t>
-            </a:r>
+              <a:t>So the pictures you’ll see in the game will be different from each other in two ways.</a:t>
+            </a:r>
+            <a:r>
+              <a:rPr lang="en-US" sz="1800" dirty="0">
+                <a:effectLst/>
+              </a:rPr>
+              <a:t> </a:t>
+            </a:r>
+            <a:endParaRPr lang="en-US" sz="1200" kern="100" dirty="0">
+              <a:effectLst/>
+              <a:latin typeface="Calibri" panose="020F0502020204030204" pitchFamily="34" charset="0"/>
+              <a:ea typeface="Calibri" panose="020F0502020204030204" pitchFamily="34" charset="0"/>
+              <a:cs typeface="Times New Roman" panose="02020603050405020304" pitchFamily="18" charset="0"/>
+            </a:endParaRPr>
           </a:p>
           <a:p>
             <a:endParaRPr lang="en-US" dirty="0"/>
@@ -575,13 +568,7 @@
       </p:sp>
       <p:sp>
         <p:nvSpPr>
-          <p:cNvPr id="4" name="Slide Number Placeholder 3">
-            <a:extLst>
-              <a:ext uri="{FF2B5EF4-FFF2-40B4-BE49-F238E27FC236}">
-                <a16:creationId xmlns:a16="http://schemas.microsoft.com/office/drawing/2014/main" id="{380AB3D5-0E98-F035-D7F6-112FF6A62C89}"/>
-              </a:ext>
-            </a:extLst>
-          </p:cNvPr>
+          <p:cNvPr id="4" name="Slide Number Placeholder 3"/>
           <p:cNvSpPr>
             <a:spLocks noGrp="1"/>
           </p:cNvSpPr>
@@ -594,7 +581,7 @@
           <a:bodyPr/>
           <a:lstStyle/>
           <a:p>
-            <a:fld id="{8A50A04F-63C2-3B49-B3BB-035920E5F412}" type="slidenum">
+            <a:fld id="{EDB909E9-0F6D-7A4D-AD58-6B87AB0BF5BB}" type="slidenum">
               <a:rPr lang="en-US" smtClean="0"/>
               <a:t>1</a:t>
             </a:fld>
@@ -605,7 +592,7 @@
     </p:spTree>
     <p:extLst>
       <p:ext uri="{BB962C8B-B14F-4D97-AF65-F5344CB8AC3E}">
-        <p14:creationId xmlns:p14="http://schemas.microsoft.com/office/powerpoint/2010/main" val="2713861130"/>
+        <p14:creationId xmlns:p14="http://schemas.microsoft.com/office/powerpoint/2010/main" val="2772250137"/>
       </p:ext>
     </p:extLst>
   </p:cSld>
@@ -620,7 +607,13 @@
   <p:cSld>
     <p:spTree>
       <p:nvGrpSpPr>
-        <p:cNvPr id="1" name=""/>
+        <p:cNvPr id="1" name="">
+          <a:extLst>
+            <a:ext uri="{FF2B5EF4-FFF2-40B4-BE49-F238E27FC236}">
+              <a16:creationId xmlns:a16="http://schemas.microsoft.com/office/drawing/2014/main" id="{5743CAC2-7C2B-36BA-8C0E-D6AB66B3C8E9}"/>
+            </a:ext>
+          </a:extLst>
+        </p:cNvPr>
         <p:cNvGrpSpPr/>
         <p:nvPr/>
       </p:nvGrpSpPr>
@@ -634,7 +627,13 @@
       </p:grpSpPr>
       <p:sp>
         <p:nvSpPr>
-          <p:cNvPr id="2" name="Slide Image Placeholder 1"/>
+          <p:cNvPr id="2" name="Slide Image Placeholder 1">
+            <a:extLst>
+              <a:ext uri="{FF2B5EF4-FFF2-40B4-BE49-F238E27FC236}">
+                <a16:creationId xmlns:a16="http://schemas.microsoft.com/office/drawing/2014/main" id="{29A0B9F9-683D-3A55-0AA6-2B0B13C49E3A}"/>
+              </a:ext>
+            </a:extLst>
+          </p:cNvPr>
           <p:cNvSpPr>
             <a:spLocks noGrp="1" noRot="1" noChangeAspect="1"/>
           </p:cNvSpPr>
@@ -646,7 +645,13 @@
       </p:sp>
       <p:sp>
         <p:nvSpPr>
-          <p:cNvPr id="3" name="Notes Placeholder 2"/>
+          <p:cNvPr id="3" name="Notes Placeholder 2">
+            <a:extLst>
+              <a:ext uri="{FF2B5EF4-FFF2-40B4-BE49-F238E27FC236}">
+                <a16:creationId xmlns:a16="http://schemas.microsoft.com/office/drawing/2014/main" id="{6BBC74B5-CDC1-B2BA-73F6-2935D1B2DDCD}"/>
+              </a:ext>
+            </a:extLst>
+          </p:cNvPr>
           <p:cNvSpPr>
             <a:spLocks noGrp="1"/>
           </p:cNvSpPr>
@@ -676,6 +681,31 @@
               <a:tabLst/>
               <a:defRPr/>
             </a:pPr>
+            <a:endParaRPr lang="en-US" sz="1800" kern="100" dirty="0">
+              <a:effectLst/>
+              <a:latin typeface="Calibri" panose="020F0502020204030204" pitchFamily="34" charset="0"/>
+              <a:ea typeface="Calibri" panose="020F0502020204030204" pitchFamily="34" charset="0"/>
+              <a:cs typeface="Times New Roman" panose="02020603050405020304" pitchFamily="18" charset="0"/>
+            </a:endParaRPr>
+          </a:p>
+          <a:p>
+            <a:pPr marL="0" marR="0" lvl="0" indent="0" algn="l" defTabSz="914400" rtl="0" eaLnBrk="1" fontAlgn="auto" latinLnBrk="0" hangingPunct="1">
+              <a:lnSpc>
+                <a:spcPct val="100000"/>
+              </a:lnSpc>
+              <a:spcBef>
+                <a:spcPts val="0"/>
+              </a:spcBef>
+              <a:spcAft>
+                <a:spcPts val="0"/>
+              </a:spcAft>
+              <a:buClrTx/>
+              <a:buSzTx/>
+              <a:buFontTx/>
+              <a:buNone/>
+              <a:tabLst/>
+              <a:defRPr/>
+            </a:pPr>
             <a:r>
               <a:rPr lang="en-US" sz="1800" kern="100" dirty="0">
                 <a:effectLst/>
@@ -683,14 +713,20 @@
                 <a:ea typeface="Calibri" panose="020F0502020204030204" pitchFamily="34" charset="0"/>
                 <a:cs typeface="Times New Roman" panose="02020603050405020304" pitchFamily="18" charset="0"/>
               </a:rPr>
-              <a:t>There are four different kinds of pictures. </a:t>
-            </a:r>
-          </a:p>
-        </p:txBody>
-      </p:sp>
-      <p:sp>
-        <p:nvSpPr>
-          <p:cNvPr id="4" name="Slide Number Placeholder 3"/>
+              <a:t>First, in different pictures, a different Wuggle will be talking to Wiggle. </a:t>
+            </a:r>
+          </a:p>
+        </p:txBody>
+      </p:sp>
+      <p:sp>
+        <p:nvSpPr>
+          <p:cNvPr id="4" name="Slide Number Placeholder 3">
+            <a:extLst>
+              <a:ext uri="{FF2B5EF4-FFF2-40B4-BE49-F238E27FC236}">
+                <a16:creationId xmlns:a16="http://schemas.microsoft.com/office/drawing/2014/main" id="{90A31AD8-7948-5E31-CC36-6E1BFBF240F0}"/>
+              </a:ext>
+            </a:extLst>
+          </p:cNvPr>
           <p:cNvSpPr>
             <a:spLocks noGrp="1"/>
           </p:cNvSpPr>
@@ -703,7 +739,7 @@
           <a:bodyPr/>
           <a:lstStyle/>
           <a:p>
-            <a:fld id="{EDB909E9-0F6D-7A4D-AD58-6B87AB0BF5BB}" type="slidenum">
+            <a:fld id="{8A50A04F-63C2-3B49-B3BB-035920E5F412}" type="slidenum">
               <a:rPr lang="en-US" smtClean="0"/>
               <a:t>2</a:t>
             </a:fld>
@@ -714,7 +750,7 @@
     </p:spTree>
     <p:extLst>
       <p:ext uri="{BB962C8B-B14F-4D97-AF65-F5344CB8AC3E}">
-        <p14:creationId xmlns:p14="http://schemas.microsoft.com/office/powerpoint/2010/main" val="3338069230"/>
+        <p14:creationId xmlns:p14="http://schemas.microsoft.com/office/powerpoint/2010/main" val="1599233464"/>
       </p:ext>
     </p:extLst>
   </p:cSld>
@@ -786,22 +822,13 @@
           <a:bodyPr/>
           <a:lstStyle/>
           <a:p>
-            <a:pPr marL="0" marR="0" lvl="0" indent="0" algn="l" defTabSz="914400" rtl="0" eaLnBrk="1" fontAlgn="auto" latinLnBrk="0" hangingPunct="1">
-              <a:lnSpc>
-                <a:spcPct val="100000"/>
-              </a:lnSpc>
+            <a:pPr marL="0" marR="0">
               <a:spcBef>
                 <a:spcPts val="0"/>
               </a:spcBef>
               <a:spcAft>
                 <a:spcPts val="0"/>
               </a:spcAft>
-              <a:buClrTx/>
-              <a:buSzTx/>
-              <a:buFontTx/>
-              <a:buNone/>
-              <a:tabLst/>
-              <a:defRPr/>
             </a:pPr>
             <a:r>
               <a:rPr lang="en-US" sz="1800" kern="100" dirty="0">
@@ -810,96 +837,7 @@
                 <a:ea typeface="Calibri" panose="020F0502020204030204" pitchFamily="34" charset="0"/>
                 <a:cs typeface="Times New Roman" panose="02020603050405020304" pitchFamily="18" charset="0"/>
               </a:rPr>
-              <a:t>In some pictures this </a:t>
-            </a:r>
-            <a:r>
-              <a:rPr lang="en-US" sz="1800" kern="100" dirty="0" err="1">
-                <a:effectLst/>
-                <a:latin typeface="Calibri" panose="020F0502020204030204" pitchFamily="34" charset="0"/>
-                <a:ea typeface="Calibri" panose="020F0502020204030204" pitchFamily="34" charset="0"/>
-                <a:cs typeface="Times New Roman" panose="02020603050405020304" pitchFamily="18" charset="0"/>
-              </a:rPr>
-              <a:t>wuggle</a:t>
-            </a:r>
-            <a:r>
-              <a:rPr lang="en-US" sz="1800" kern="100" dirty="0">
-                <a:effectLst/>
-                <a:latin typeface="Calibri" panose="020F0502020204030204" pitchFamily="34" charset="0"/>
-                <a:ea typeface="Calibri" panose="020F0502020204030204" pitchFamily="34" charset="0"/>
-                <a:cs typeface="Times New Roman" panose="02020603050405020304" pitchFamily="18" charset="0"/>
-              </a:rPr>
-              <a:t> # will be talking to Wiggle.</a:t>
-            </a:r>
-          </a:p>
-          <a:p>
-            <a:pPr marL="0" marR="0" lvl="0" indent="0" algn="l" defTabSz="914400" rtl="0" eaLnBrk="1" fontAlgn="auto" latinLnBrk="0" hangingPunct="1">
-              <a:lnSpc>
-                <a:spcPct val="100000"/>
-              </a:lnSpc>
-              <a:spcBef>
-                <a:spcPts val="0"/>
-              </a:spcBef>
-              <a:spcAft>
-                <a:spcPts val="0"/>
-              </a:spcAft>
-              <a:buClrTx/>
-              <a:buSzTx/>
-              <a:buFontTx/>
-              <a:buNone/>
-              <a:tabLst/>
-              <a:defRPr/>
-            </a:pPr>
-            <a:endParaRPr lang="en-US" sz="1800" kern="100" dirty="0">
-              <a:effectLst/>
-              <a:latin typeface="Calibri" panose="020F0502020204030204" pitchFamily="34" charset="0"/>
-              <a:ea typeface="Calibri" panose="020F0502020204030204" pitchFamily="34" charset="0"/>
-              <a:cs typeface="Times New Roman" panose="02020603050405020304" pitchFamily="18" charset="0"/>
-            </a:endParaRPr>
-          </a:p>
-          <a:p>
-            <a:pPr marL="0" marR="0" lvl="0" indent="0" algn="l" defTabSz="914400" rtl="0" eaLnBrk="1" fontAlgn="auto" latinLnBrk="0" hangingPunct="1">
-              <a:lnSpc>
-                <a:spcPct val="100000"/>
-              </a:lnSpc>
-              <a:spcBef>
-                <a:spcPts val="0"/>
-              </a:spcBef>
-              <a:spcAft>
-                <a:spcPts val="0"/>
-              </a:spcAft>
-              <a:buClrTx/>
-              <a:buSzTx/>
-              <a:buFontTx/>
-              <a:buNone/>
-              <a:tabLst/>
-              <a:defRPr/>
-            </a:pPr>
-            <a:r>
-              <a:rPr lang="en-US" sz="1800" kern="100" dirty="0">
-                <a:effectLst/>
-                <a:latin typeface="Calibri" panose="020F0502020204030204" pitchFamily="34" charset="0"/>
-                <a:ea typeface="Calibri" panose="020F0502020204030204" pitchFamily="34" charset="0"/>
-                <a:cs typeface="Times New Roman" panose="02020603050405020304" pitchFamily="18" charset="0"/>
-              </a:rPr>
-              <a:t>And in other pictures this </a:t>
-            </a:r>
-            <a:r>
-              <a:rPr lang="en-US" sz="1800" kern="100" dirty="0" err="1">
-                <a:effectLst/>
-                <a:latin typeface="Calibri" panose="020F0502020204030204" pitchFamily="34" charset="0"/>
-                <a:ea typeface="Calibri" panose="020F0502020204030204" pitchFamily="34" charset="0"/>
-                <a:cs typeface="Times New Roman" panose="02020603050405020304" pitchFamily="18" charset="0"/>
-              </a:rPr>
-              <a:t>wuggle</a:t>
-            </a:r>
-            <a:r>
-              <a:rPr lang="en-US" sz="1800" kern="100" dirty="0">
-                <a:effectLst/>
-                <a:latin typeface="Calibri" panose="020F0502020204030204" pitchFamily="34" charset="0"/>
-                <a:ea typeface="Calibri" panose="020F0502020204030204" pitchFamily="34" charset="0"/>
-                <a:cs typeface="Times New Roman" panose="02020603050405020304" pitchFamily="18" charset="0"/>
-              </a:rPr>
-              <a:t> # will be talking to Wiggle.</a:t>
+              <a:t>Second, in different pictures, Wuggle’s face will look different. </a:t>
             </a:r>
           </a:p>
         </p:txBody>
@@ -936,7 +874,7 @@
     </p:spTree>
     <p:extLst>
       <p:ext uri="{BB962C8B-B14F-4D97-AF65-F5344CB8AC3E}">
-        <p14:creationId xmlns:p14="http://schemas.microsoft.com/office/powerpoint/2010/main" val="1599233464"/>
+        <p14:creationId xmlns:p14="http://schemas.microsoft.com/office/powerpoint/2010/main" val="1960272301"/>
       </p:ext>
     </p:extLst>
   </p:cSld>
@@ -947,102 +885,6 @@
 </file>
 
 <file path=ppt/notesSlides/notesSlide4.xml><?xml version="1.0" encoding="utf-8"?>
-<p:notes xmlns:a="http://schemas.openxmlformats.org/drawingml/2006/main" xmlns:r="http://schemas.openxmlformats.org/officeDocument/2006/relationships" xmlns:p="http://schemas.openxmlformats.org/presentationml/2006/main">
-  <p:cSld>
-    <p:spTree>
-      <p:nvGrpSpPr>
-        <p:cNvPr id="1" name=""/>
-        <p:cNvGrpSpPr/>
-        <p:nvPr/>
-      </p:nvGrpSpPr>
-      <p:grpSpPr>
-        <a:xfrm>
-          <a:off x="0" y="0"/>
-          <a:ext cx="0" cy="0"/>
-          <a:chOff x="0" y="0"/>
-          <a:chExt cx="0" cy="0"/>
-        </a:xfrm>
-      </p:grpSpPr>
-      <p:sp>
-        <p:nvSpPr>
-          <p:cNvPr id="2" name="Slide Image Placeholder 1"/>
-          <p:cNvSpPr>
-            <a:spLocks noGrp="1" noRot="1" noChangeAspect="1"/>
-          </p:cNvSpPr>
-          <p:nvPr>
-            <p:ph type="sldImg"/>
-          </p:nvPr>
-        </p:nvSpPr>
-        <p:spPr/>
-      </p:sp>
-      <p:sp>
-        <p:nvSpPr>
-          <p:cNvPr id="3" name="Notes Placeholder 2"/>
-          <p:cNvSpPr>
-            <a:spLocks noGrp="1"/>
-          </p:cNvSpPr>
-          <p:nvPr>
-            <p:ph type="body" idx="1"/>
-          </p:nvPr>
-        </p:nvSpPr>
-        <p:spPr/>
-        <p:txBody>
-          <a:bodyPr/>
-          <a:lstStyle/>
-          <a:p>
-            <a:r>
-              <a:rPr lang="en-US" dirty="0"/>
-              <a:t>In some pictures, Wiggle’s face will look like this. #</a:t>
-            </a:r>
-          </a:p>
-          <a:p>
-            <a:endParaRPr lang="en-US" dirty="0"/>
-          </a:p>
-          <a:p>
-            <a:r>
-              <a:rPr lang="en-US" dirty="0"/>
-              <a:t>And in other pictures, Wiggle’s face will look like this. #</a:t>
-            </a:r>
-          </a:p>
-        </p:txBody>
-      </p:sp>
-      <p:sp>
-        <p:nvSpPr>
-          <p:cNvPr id="4" name="Slide Number Placeholder 3"/>
-          <p:cNvSpPr>
-            <a:spLocks noGrp="1"/>
-          </p:cNvSpPr>
-          <p:nvPr>
-            <p:ph type="sldNum" sz="quarter" idx="5"/>
-          </p:nvPr>
-        </p:nvSpPr>
-        <p:spPr/>
-        <p:txBody>
-          <a:bodyPr/>
-          <a:lstStyle/>
-          <a:p>
-            <a:fld id="{8A50A04F-63C2-3B49-B3BB-035920E5F412}" type="slidenum">
-              <a:rPr lang="en-US" smtClean="0"/>
-              <a:t>4</a:t>
-            </a:fld>
-            <a:endParaRPr lang="en-US"/>
-          </a:p>
-        </p:txBody>
-      </p:sp>
-    </p:spTree>
-    <p:extLst>
-      <p:ext uri="{BB962C8B-B14F-4D97-AF65-F5344CB8AC3E}">
-        <p14:creationId xmlns:p14="http://schemas.microsoft.com/office/powerpoint/2010/main" val="1571900768"/>
-      </p:ext>
-    </p:extLst>
-  </p:cSld>
-  <p:clrMapOvr>
-    <a:masterClrMapping/>
-  </p:clrMapOvr>
-</p:notes>
-</file>
-
-<file path=ppt/notesSlides/notesSlide5.xml><?xml version="1.0" encoding="utf-8"?>
 <p:notes xmlns:a="http://schemas.openxmlformats.org/drawingml/2006/main" xmlns:r="http://schemas.openxmlformats.org/officeDocument/2006/relationships" xmlns:p="http://schemas.openxmlformats.org/presentationml/2006/main">
   <p:cSld>
     <p:spTree>
@@ -1150,7 +992,7 @@
           <a:p>
             <a:fld id="{8A50A04F-63C2-3B49-B3BB-035920E5F412}" type="slidenum">
               <a:rPr lang="en-US" smtClean="0"/>
-              <a:t>5</a:t>
+              <a:t>4</a:t>
             </a:fld>
             <a:endParaRPr lang="en-US"/>
           </a:p>
@@ -1316,7 +1158,7 @@
           <a:p>
             <a:fld id="{39010F46-BC5C-5B46-8205-6155B813C0D0}" type="datetimeFigureOut">
               <a:rPr lang="en-US" smtClean="0"/>
-              <a:t>2/22/24</a:t>
+              <a:t>4/10/24</a:t>
             </a:fld>
             <a:endParaRPr lang="en-US"/>
           </a:p>
@@ -1514,7 +1356,7 @@
           <a:p>
             <a:fld id="{39010F46-BC5C-5B46-8205-6155B813C0D0}" type="datetimeFigureOut">
               <a:rPr lang="en-US" smtClean="0"/>
-              <a:t>2/22/24</a:t>
+              <a:t>4/10/24</a:t>
             </a:fld>
             <a:endParaRPr lang="en-US"/>
           </a:p>
@@ -1722,7 +1564,7 @@
           <a:p>
             <a:fld id="{39010F46-BC5C-5B46-8205-6155B813C0D0}" type="datetimeFigureOut">
               <a:rPr lang="en-US" smtClean="0"/>
-              <a:t>2/22/24</a:t>
+              <a:t>4/10/24</a:t>
             </a:fld>
             <a:endParaRPr lang="en-US"/>
           </a:p>
@@ -1920,7 +1762,7 @@
           <a:p>
             <a:fld id="{39010F46-BC5C-5B46-8205-6155B813C0D0}" type="datetimeFigureOut">
               <a:rPr lang="en-US" smtClean="0"/>
-              <a:t>2/22/24</a:t>
+              <a:t>4/10/24</a:t>
             </a:fld>
             <a:endParaRPr lang="en-US"/>
           </a:p>
@@ -2195,7 +2037,7 @@
           <a:p>
             <a:fld id="{39010F46-BC5C-5B46-8205-6155B813C0D0}" type="datetimeFigureOut">
               <a:rPr lang="en-US" smtClean="0"/>
-              <a:t>2/22/24</a:t>
+              <a:t>4/10/24</a:t>
             </a:fld>
             <a:endParaRPr lang="en-US"/>
           </a:p>
@@ -2460,7 +2302,7 @@
           <a:p>
             <a:fld id="{39010F46-BC5C-5B46-8205-6155B813C0D0}" type="datetimeFigureOut">
               <a:rPr lang="en-US" smtClean="0"/>
-              <a:t>2/22/24</a:t>
+              <a:t>4/10/24</a:t>
             </a:fld>
             <a:endParaRPr lang="en-US"/>
           </a:p>
@@ -2872,7 +2714,7 @@
           <a:p>
             <a:fld id="{39010F46-BC5C-5B46-8205-6155B813C0D0}" type="datetimeFigureOut">
               <a:rPr lang="en-US" smtClean="0"/>
-              <a:t>2/22/24</a:t>
+              <a:t>4/10/24</a:t>
             </a:fld>
             <a:endParaRPr lang="en-US"/>
           </a:p>
@@ -3013,7 +2855,7 @@
           <a:p>
             <a:fld id="{39010F46-BC5C-5B46-8205-6155B813C0D0}" type="datetimeFigureOut">
               <a:rPr lang="en-US" smtClean="0"/>
-              <a:t>2/22/24</a:t>
+              <a:t>4/10/24</a:t>
             </a:fld>
             <a:endParaRPr lang="en-US"/>
           </a:p>
@@ -3126,7 +2968,7 @@
           <a:p>
             <a:fld id="{39010F46-BC5C-5B46-8205-6155B813C0D0}" type="datetimeFigureOut">
               <a:rPr lang="en-US" smtClean="0"/>
-              <a:t>2/22/24</a:t>
+              <a:t>4/10/24</a:t>
             </a:fld>
             <a:endParaRPr lang="en-US"/>
           </a:p>
@@ -3437,7 +3279,7 @@
           <a:p>
             <a:fld id="{39010F46-BC5C-5B46-8205-6155B813C0D0}" type="datetimeFigureOut">
               <a:rPr lang="en-US" smtClean="0"/>
-              <a:t>2/22/24</a:t>
+              <a:t>4/10/24</a:t>
             </a:fld>
             <a:endParaRPr lang="en-US"/>
           </a:p>
@@ -3725,7 +3567,7 @@
           <a:p>
             <a:fld id="{39010F46-BC5C-5B46-8205-6155B813C0D0}" type="datetimeFigureOut">
               <a:rPr lang="en-US" smtClean="0"/>
-              <a:t>2/22/24</a:t>
+              <a:t>4/10/24</a:t>
             </a:fld>
             <a:endParaRPr lang="en-US"/>
           </a:p>
@@ -3966,7 +3808,7 @@
           <a:p>
             <a:fld id="{39010F46-BC5C-5B46-8205-6155B813C0D0}" type="datetimeFigureOut">
               <a:rPr lang="en-US" smtClean="0"/>
-              <a:t>2/22/24</a:t>
+              <a:t>4/10/24</a:t>
             </a:fld>
             <a:endParaRPr lang="en-US"/>
           </a:p>
@@ -4371,13 +4213,7 @@
   <p:cSld>
     <p:spTree>
       <p:nvGrpSpPr>
-        <p:cNvPr id="1" name="">
-          <a:extLst>
-            <a:ext uri="{FF2B5EF4-FFF2-40B4-BE49-F238E27FC236}">
-              <a16:creationId xmlns:a16="http://schemas.microsoft.com/office/drawing/2014/main" id="{C4E6D5F3-7E1F-6F6F-C5CC-36A6030516B4}"/>
-            </a:ext>
-          </a:extLst>
-        </p:cNvPr>
+        <p:cNvPr id="1" name=""/>
         <p:cNvGrpSpPr/>
         <p:nvPr/>
       </p:nvGrpSpPr>
@@ -4391,39 +4227,10 @@
       </p:grpSpPr>
       <p:pic>
         <p:nvPicPr>
-          <p:cNvPr id="2" name="Picture 1">
-            <a:extLst>
-              <a:ext uri="{FF2B5EF4-FFF2-40B4-BE49-F238E27FC236}">
-                <a16:creationId xmlns:a16="http://schemas.microsoft.com/office/drawing/2014/main" id="{B75B097E-3A99-26A0-4868-82A256A9C19F}"/>
-              </a:ext>
-            </a:extLst>
-          </p:cNvPr>
-          <p:cNvPicPr>
-            <a:picLocks noChangeAspect="1"/>
-          </p:cNvPicPr>
-          <p:nvPr/>
-        </p:nvPicPr>
-        <p:blipFill>
-          <a:blip r:embed="rId5"/>
-          <a:srcRect/>
-          <a:stretch/>
-        </p:blipFill>
-        <p:spPr>
-          <a:xfrm>
-            <a:off x="3556000" y="850900"/>
-            <a:ext cx="5080000" cy="5080000"/>
-          </a:xfrm>
-          <a:prstGeom prst="rect">
-            <a:avLst/>
-          </a:prstGeom>
-        </p:spPr>
-      </p:pic>
-      <p:pic>
-        <p:nvPicPr>
-          <p:cNvPr id="4" name="Audio 3">
-            <a:extLst>
-              <a:ext uri="{FF2B5EF4-FFF2-40B4-BE49-F238E27FC236}">
-                <a16:creationId xmlns:a16="http://schemas.microsoft.com/office/drawing/2014/main" id="{A923E150-5297-F75B-276A-5EECE2392E24}"/>
+          <p:cNvPr id="7" name="Audio 6">
+            <a:extLst>
+              <a:ext uri="{FF2B5EF4-FFF2-40B4-BE49-F238E27FC236}">
+                <a16:creationId xmlns:a16="http://schemas.microsoft.com/office/drawing/2014/main" id="{364AB22F-9F4B-2279-FD1D-FB89622AF2FA}"/>
               </a:ext>
             </a:extLst>
           </p:cNvPr>
@@ -4440,7 +4247,7 @@
           </p:nvPr>
         </p:nvPicPr>
         <p:blipFill>
-          <a:blip r:embed="rId6"/>
+          <a:blip r:embed="rId5"/>
           <a:stretch>
             <a:fillRect/>
           </a:stretch>
@@ -4458,19 +4265,19 @@
     </p:spTree>
     <p:extLst>
       <p:ext uri="{BB962C8B-B14F-4D97-AF65-F5344CB8AC3E}">
-        <p14:creationId xmlns:p14="http://schemas.microsoft.com/office/powerpoint/2010/main" val="2496675178"/>
+        <p14:creationId xmlns:p14="http://schemas.microsoft.com/office/powerpoint/2010/main" val="4242627232"/>
       </p:ext>
     </p:extLst>
   </p:cSld>
   <p:clrMapOvr>
     <a:masterClrMapping/>
   </p:clrMapOvr>
-  <mc:AlternateContent xmlns:mc="http://schemas.openxmlformats.org/markup-compatibility/2006" xmlns:p14="http://schemas.microsoft.com/office/powerpoint/2010/main">
-    <mc:Choice Requires="p14">
-      <p:transition spd="slow" p14:dur="2000" advTm="7157"/>
+  <mc:AlternateContent xmlns:mc="http://schemas.openxmlformats.org/markup-compatibility/2006">
+    <mc:Choice xmlns:p14="http://schemas.microsoft.com/office/powerpoint/2010/main" Requires="p14">
+      <p:transition spd="slow" p14:dur="2000" advTm="7104"/>
     </mc:Choice>
-    <mc:Fallback xmlns="">
-      <p:transition spd="slow" advTm="7157"/>
+    <mc:Fallback>
+      <p:transition spd="slow" advTm="7104"/>
     </mc:Fallback>
   </mc:AlternateContent>
   <p:timing>
@@ -4506,7 +4313,7 @@
                                       <p:cBhvr>
                                         <p:cTn id="6" dur="1" fill="hold"/>
                                         <p:tgtEl>
-                                          <p:spTgt spid="4"/>
+                                          <p:spTgt spid="7"/>
                                         </p:tgtEl>
                                       </p:cBhvr>
                                     </p:cmd>
@@ -4551,7 +4358,7 @@
                   </p:endCondLst>
                 </p:cTn>
                 <p:tgtEl>
-                  <p:spTgt spid="4"/>
+                  <p:spTgt spid="7"/>
                 </p:tgtEl>
               </p:cMediaNode>
             </p:audio>
@@ -4568,7 +4375,13 @@
   <p:cSld>
     <p:spTree>
       <p:nvGrpSpPr>
-        <p:cNvPr id="1" name=""/>
+        <p:cNvPr id="1" name="">
+          <a:extLst>
+            <a:ext uri="{FF2B5EF4-FFF2-40B4-BE49-F238E27FC236}">
+              <a16:creationId xmlns:a16="http://schemas.microsoft.com/office/drawing/2014/main" id="{E1F2284E-724D-CC78-CDB7-9C285B310F1F}"/>
+            </a:ext>
+          </a:extLst>
+        </p:cNvPr>
         <p:cNvGrpSpPr/>
         <p:nvPr/>
       </p:nvGrpSpPr>
@@ -4582,10 +4395,10 @@
       </p:grpSpPr>
       <p:pic>
         <p:nvPicPr>
-          <p:cNvPr id="2" name="Picture 1">
-            <a:extLst>
-              <a:ext uri="{FF2B5EF4-FFF2-40B4-BE49-F238E27FC236}">
-                <a16:creationId xmlns:a16="http://schemas.microsoft.com/office/drawing/2014/main" id="{0EECFB2F-B29F-2C86-0E48-6ABF3C9AA151}"/>
+          <p:cNvPr id="5" name="Picture 4">
+            <a:extLst>
+              <a:ext uri="{FF2B5EF4-FFF2-40B4-BE49-F238E27FC236}">
+                <a16:creationId xmlns:a16="http://schemas.microsoft.com/office/drawing/2014/main" id="{426FB61E-9C11-DE62-F6FA-96AD45080F9E}"/>
               </a:ext>
             </a:extLst>
           </p:cNvPr>
@@ -4595,13 +4408,13 @@
           <p:nvPr/>
         </p:nvPicPr>
         <p:blipFill>
-          <a:blip r:embed="rId5"/>
+          <a:blip r:embed="rId6"/>
           <a:srcRect/>
           <a:stretch/>
         </p:blipFill>
         <p:spPr>
           <a:xfrm>
-            <a:off x="317500" y="357415"/>
+            <a:off x="2235200" y="1881415"/>
             <a:ext cx="2743200" cy="2743200"/>
           </a:xfrm>
           <a:prstGeom prst="rect">
@@ -4611,10 +4424,10 @@
       </p:pic>
       <p:pic>
         <p:nvPicPr>
-          <p:cNvPr id="3" name="Picture 2">
-            <a:extLst>
-              <a:ext uri="{FF2B5EF4-FFF2-40B4-BE49-F238E27FC236}">
-                <a16:creationId xmlns:a16="http://schemas.microsoft.com/office/drawing/2014/main" id="{AB978213-EF39-0C03-FA97-17D114BFC3E7}"/>
+          <p:cNvPr id="30" name="Picture 29">
+            <a:extLst>
+              <a:ext uri="{FF2B5EF4-FFF2-40B4-BE49-F238E27FC236}">
+                <a16:creationId xmlns:a16="http://schemas.microsoft.com/office/drawing/2014/main" id="{77970179-75B4-0B8B-F481-5A637DB6DD2A}"/>
               </a:ext>
             </a:extLst>
           </p:cNvPr>
@@ -4624,13 +4437,13 @@
           <p:nvPr/>
         </p:nvPicPr>
         <p:blipFill>
-          <a:blip r:embed="rId5"/>
+          <a:blip r:embed="rId7"/>
           <a:srcRect/>
           <a:stretch/>
         </p:blipFill>
         <p:spPr>
           <a:xfrm>
-            <a:off x="6605814" y="357415"/>
+            <a:off x="7213600" y="1881415"/>
             <a:ext cx="2743200" cy="2743200"/>
           </a:xfrm>
           <a:prstGeom prst="rect">
@@ -4640,229 +4453,27 @@
       </p:pic>
       <p:pic>
         <p:nvPicPr>
-          <p:cNvPr id="4" name="Picture 3">
-            <a:extLst>
-              <a:ext uri="{FF2B5EF4-FFF2-40B4-BE49-F238E27FC236}">
-                <a16:creationId xmlns:a16="http://schemas.microsoft.com/office/drawing/2014/main" id="{1FC9AFF0-996D-2E33-EB71-46A91E156921}"/>
+          <p:cNvPr id="10" name="Audio 9">
+            <a:extLst>
+              <a:ext uri="{FF2B5EF4-FFF2-40B4-BE49-F238E27FC236}">
+                <a16:creationId xmlns:a16="http://schemas.microsoft.com/office/drawing/2014/main" id="{32E1F8A7-99E8-2652-58A3-7E9B9AF3E6A7}"/>
               </a:ext>
             </a:extLst>
           </p:cNvPr>
           <p:cNvPicPr>
             <a:picLocks noChangeAspect="1"/>
           </p:cNvPicPr>
-          <p:nvPr/>
+          <p:nvPr>
+            <a:audioFile r:link="rId3"/>
+            <p:extLst>
+              <p:ext uri="{DAA4B4D4-6D71-4841-9C94-3DE7FCFB9230}">
+                <p14:media xmlns:p14="http://schemas.microsoft.com/office/powerpoint/2010/main" r:embed="rId2"/>
+              </p:ext>
+            </p:extLst>
+          </p:nvPr>
         </p:nvPicPr>
         <p:blipFill>
-          <a:blip r:embed="rId5"/>
-          <a:srcRect/>
-          <a:stretch/>
-        </p:blipFill>
-        <p:spPr>
-          <a:xfrm>
-            <a:off x="317500" y="3757386"/>
-            <a:ext cx="2743200" cy="2743200"/>
-          </a:xfrm>
-          <a:prstGeom prst="rect">
-            <a:avLst/>
-          </a:prstGeom>
-        </p:spPr>
-      </p:pic>
-      <p:pic>
-        <p:nvPicPr>
-          <p:cNvPr id="5" name="Picture 4">
-            <a:extLst>
-              <a:ext uri="{FF2B5EF4-FFF2-40B4-BE49-F238E27FC236}">
-                <a16:creationId xmlns:a16="http://schemas.microsoft.com/office/drawing/2014/main" id="{5CCB7DBE-5FCD-D6C8-33B1-5470A2FCC157}"/>
-              </a:ext>
-            </a:extLst>
-          </p:cNvPr>
-          <p:cNvPicPr>
-            <a:picLocks noChangeAspect="1"/>
-          </p:cNvPicPr>
-          <p:nvPr/>
-        </p:nvPicPr>
-        <p:blipFill>
-          <a:blip r:embed="rId5"/>
-          <a:srcRect/>
-          <a:stretch/>
-        </p:blipFill>
-        <p:spPr>
-          <a:xfrm>
-            <a:off x="6605814" y="3757386"/>
-            <a:ext cx="2743200" cy="2743200"/>
-          </a:xfrm>
-          <a:prstGeom prst="rect">
-            <a:avLst/>
-          </a:prstGeom>
-        </p:spPr>
-      </p:pic>
-      <p:sp>
-        <p:nvSpPr>
-          <p:cNvPr id="8" name="TextBox 7">
-            <a:extLst>
-              <a:ext uri="{FF2B5EF4-FFF2-40B4-BE49-F238E27FC236}">
-                <a16:creationId xmlns:a16="http://schemas.microsoft.com/office/drawing/2014/main" id="{32042FCC-0E15-3299-B978-B53092FE7E8F}"/>
-              </a:ext>
-            </a:extLst>
-          </p:cNvPr>
-          <p:cNvSpPr txBox="1"/>
-          <p:nvPr/>
-        </p:nvSpPr>
-        <p:spPr>
-          <a:xfrm>
-            <a:off x="325699" y="374752"/>
-            <a:ext cx="2743200" cy="2743200"/>
-          </a:xfrm>
-          <a:prstGeom prst="rect">
-            <a:avLst/>
-          </a:prstGeom>
-          <a:noFill/>
-        </p:spPr>
-        <p:txBody>
-          <a:bodyPr wrap="none" rtlCol="0" anchor="ctr">
-            <a:spAutoFit/>
-          </a:bodyPr>
-          <a:lstStyle/>
-          <a:p>
-            <a:pPr algn="ctr"/>
-            <a:r>
-              <a:rPr lang="en-US" sz="7200" dirty="0"/>
-              <a:t>1</a:t>
-            </a:r>
-          </a:p>
-        </p:txBody>
-      </p:sp>
-      <p:sp>
-        <p:nvSpPr>
-          <p:cNvPr id="9" name="TextBox 8">
-            <a:extLst>
-              <a:ext uri="{FF2B5EF4-FFF2-40B4-BE49-F238E27FC236}">
-                <a16:creationId xmlns:a16="http://schemas.microsoft.com/office/drawing/2014/main" id="{6351CFD2-C1B0-5246-3CBD-458294BD9655}"/>
-              </a:ext>
-            </a:extLst>
-          </p:cNvPr>
-          <p:cNvSpPr txBox="1"/>
-          <p:nvPr/>
-        </p:nvSpPr>
-        <p:spPr>
-          <a:xfrm>
-            <a:off x="7654304" y="1163675"/>
-            <a:ext cx="652743" cy="1200329"/>
-          </a:xfrm>
-          <a:prstGeom prst="rect">
-            <a:avLst/>
-          </a:prstGeom>
-          <a:noFill/>
-        </p:spPr>
-        <p:txBody>
-          <a:bodyPr wrap="none" rtlCol="0" anchor="ctr">
-            <a:spAutoFit/>
-          </a:bodyPr>
-          <a:lstStyle/>
-          <a:p>
-            <a:pPr algn="ctr"/>
-            <a:r>
-              <a:rPr lang="en-US" sz="7200" dirty="0"/>
-              <a:t>2</a:t>
-            </a:r>
-          </a:p>
-        </p:txBody>
-      </p:sp>
-      <p:sp>
-        <p:nvSpPr>
-          <p:cNvPr id="10" name="TextBox 9">
-            <a:extLst>
-              <a:ext uri="{FF2B5EF4-FFF2-40B4-BE49-F238E27FC236}">
-                <a16:creationId xmlns:a16="http://schemas.microsoft.com/office/drawing/2014/main" id="{E72C5E21-CEAA-711B-6006-42036C9D8147}"/>
-              </a:ext>
-            </a:extLst>
-          </p:cNvPr>
-          <p:cNvSpPr txBox="1"/>
-          <p:nvPr/>
-        </p:nvSpPr>
-        <p:spPr>
-          <a:xfrm>
-            <a:off x="1343446" y="4521471"/>
-            <a:ext cx="652743" cy="1200329"/>
-          </a:xfrm>
-          <a:prstGeom prst="rect">
-            <a:avLst/>
-          </a:prstGeom>
-          <a:noFill/>
-        </p:spPr>
-        <p:txBody>
-          <a:bodyPr wrap="none" rtlCol="0" anchor="ctr">
-            <a:spAutoFit/>
-          </a:bodyPr>
-          <a:lstStyle/>
-          <a:p>
-            <a:pPr algn="ctr"/>
-            <a:r>
-              <a:rPr lang="en-US" sz="7200" dirty="0"/>
-              <a:t>3</a:t>
-            </a:r>
-          </a:p>
-        </p:txBody>
-      </p:sp>
-      <p:sp>
-        <p:nvSpPr>
-          <p:cNvPr id="11" name="TextBox 10">
-            <a:extLst>
-              <a:ext uri="{FF2B5EF4-FFF2-40B4-BE49-F238E27FC236}">
-                <a16:creationId xmlns:a16="http://schemas.microsoft.com/office/drawing/2014/main" id="{05DB0797-52D8-6E47-EF80-3E4ACAEA1922}"/>
-              </a:ext>
-            </a:extLst>
-          </p:cNvPr>
-          <p:cNvSpPr txBox="1"/>
-          <p:nvPr/>
-        </p:nvSpPr>
-        <p:spPr>
-          <a:xfrm>
-            <a:off x="7639314" y="4506482"/>
-            <a:ext cx="652743" cy="1200329"/>
-          </a:xfrm>
-          <a:prstGeom prst="rect">
-            <a:avLst/>
-          </a:prstGeom>
-          <a:noFill/>
-        </p:spPr>
-        <p:txBody>
-          <a:bodyPr wrap="none" rtlCol="0" anchor="ctr">
-            <a:spAutoFit/>
-          </a:bodyPr>
-          <a:lstStyle/>
-          <a:p>
-            <a:pPr algn="ctr"/>
-            <a:r>
-              <a:rPr lang="en-US" sz="7200" dirty="0"/>
-              <a:t>4</a:t>
-            </a:r>
-          </a:p>
-        </p:txBody>
-      </p:sp>
-      <p:pic>
-        <p:nvPicPr>
-          <p:cNvPr id="20" name="Audio 19">
-            <a:extLst>
-              <a:ext uri="{FF2B5EF4-FFF2-40B4-BE49-F238E27FC236}">
-                <a16:creationId xmlns:a16="http://schemas.microsoft.com/office/drawing/2014/main" id="{B441CA12-E5DB-CD3A-D10D-472CC8346370}"/>
-              </a:ext>
-            </a:extLst>
-          </p:cNvPr>
-          <p:cNvPicPr>
-            <a:picLocks noChangeAspect="1"/>
-          </p:cNvPicPr>
-          <p:nvPr>
-            <a:audioFile r:link="rId2"/>
-            <p:extLst>
-              <p:ext uri="{DAA4B4D4-6D71-4841-9C94-3DE7FCFB9230}">
-                <p14:media xmlns:p14="http://schemas.microsoft.com/office/powerpoint/2010/main" r:embed="rId1"/>
-              </p:ext>
-            </p:extLst>
-          </p:nvPr>
-        </p:nvPicPr>
-        <p:blipFill>
-          <a:blip r:embed="rId6"/>
+          <a:blip r:embed="rId8"/>
           <a:stretch>
             <a:fillRect/>
           </a:stretch>
@@ -4878,21 +4489,24 @@
         </p:spPr>
       </p:pic>
     </p:spTree>
+    <p:custDataLst>
+      <p:tags r:id="rId1"/>
+    </p:custDataLst>
     <p:extLst>
       <p:ext uri="{BB962C8B-B14F-4D97-AF65-F5344CB8AC3E}">
-        <p14:creationId xmlns:p14="http://schemas.microsoft.com/office/powerpoint/2010/main" val="2221746541"/>
+        <p14:creationId xmlns:p14="http://schemas.microsoft.com/office/powerpoint/2010/main" val="2412656309"/>
       </p:ext>
     </p:extLst>
   </p:cSld>
   <p:clrMapOvr>
     <a:masterClrMapping/>
   </p:clrMapOvr>
-  <mc:AlternateContent xmlns:mc="http://schemas.openxmlformats.org/markup-compatibility/2006" xmlns:p14="http://schemas.microsoft.com/office/powerpoint/2010/main">
-    <mc:Choice Requires="p14">
-      <p:transition spd="slow" p14:dur="2000" advTm="5444"/>
+  <mc:AlternateContent xmlns:mc="http://schemas.openxmlformats.org/markup-compatibility/2006">
+    <mc:Choice xmlns:p14="http://schemas.microsoft.com/office/powerpoint/2010/main" Requires="p14">
+      <p:transition spd="slow" p14:dur="2000" advTm="7200"/>
     </mc:Choice>
-    <mc:Fallback xmlns="">
-      <p:transition spd="slow" advTm="5444"/>
+    <mc:Fallback>
+      <p:transition spd="slow" advTm="7200"/>
     </mc:Fallback>
   </mc:AlternateContent>
   <p:timing>
@@ -4928,7 +4542,7 @@
                                       <p:cBhvr>
                                         <p:cTn id="6" dur="1" fill="hold"/>
                                         <p:tgtEl>
-                                          <p:spTgt spid="20"/>
+                                          <p:spTgt spid="10"/>
                                         </p:tgtEl>
                                       </p:cBhvr>
                                     </p:cmd>
@@ -4973,7 +4587,7 @@
                   </p:endCondLst>
                 </p:cTn>
                 <p:tgtEl>
-                  <p:spTgt spid="20"/>
+                  <p:spTgt spid="10"/>
                 </p:tgtEl>
               </p:cMediaNode>
             </p:audio>
@@ -5029,36 +4643,7 @@
         </p:blipFill>
         <p:spPr>
           <a:xfrm>
-            <a:off x="317500" y="357415"/>
-            <a:ext cx="2743200" cy="2743200"/>
-          </a:xfrm>
-          <a:prstGeom prst="rect">
-            <a:avLst/>
-          </a:prstGeom>
-        </p:spPr>
-      </p:pic>
-      <p:pic>
-        <p:nvPicPr>
-          <p:cNvPr id="34" name="Picture 33">
-            <a:extLst>
-              <a:ext uri="{FF2B5EF4-FFF2-40B4-BE49-F238E27FC236}">
-                <a16:creationId xmlns:a16="http://schemas.microsoft.com/office/drawing/2014/main" id="{D0419920-D1AB-A6FB-1FE2-7DFB75104B37}"/>
-              </a:ext>
-            </a:extLst>
-          </p:cNvPr>
-          <p:cNvPicPr>
-            <a:picLocks noChangeAspect="1"/>
-          </p:cNvPicPr>
-          <p:nvPr/>
-        </p:nvPicPr>
-        <p:blipFill>
-          <a:blip r:embed="rId6"/>
-          <a:srcRect/>
-          <a:stretch/>
-        </p:blipFill>
-        <p:spPr>
-          <a:xfrm>
-            <a:off x="6605814" y="357415"/>
+            <a:off x="2235200" y="1881415"/>
             <a:ext cx="2743200" cy="2743200"/>
           </a:xfrm>
           <a:prstGeom prst="rect">
@@ -5087,7 +4672,7 @@
         </p:blipFill>
         <p:spPr>
           <a:xfrm>
-            <a:off x="317500" y="3757386"/>
+            <a:off x="7213600" y="1881415"/>
             <a:ext cx="2743200" cy="2743200"/>
           </a:xfrm>
           <a:prstGeom prst="rect">
@@ -5097,39 +4682,10 @@
       </p:pic>
       <p:pic>
         <p:nvPicPr>
-          <p:cNvPr id="38" name="Picture 37">
-            <a:extLst>
-              <a:ext uri="{FF2B5EF4-FFF2-40B4-BE49-F238E27FC236}">
-                <a16:creationId xmlns:a16="http://schemas.microsoft.com/office/drawing/2014/main" id="{44748D75-8DE5-54F6-607B-193778070116}"/>
-              </a:ext>
-            </a:extLst>
-          </p:cNvPr>
-          <p:cNvPicPr>
-            <a:picLocks noChangeAspect="1"/>
-          </p:cNvPicPr>
-          <p:nvPr/>
-        </p:nvPicPr>
-        <p:blipFill>
-          <a:blip r:embed="rId7"/>
-          <a:srcRect/>
-          <a:stretch/>
-        </p:blipFill>
-        <p:spPr>
-          <a:xfrm>
-            <a:off x="6605814" y="3757386"/>
-            <a:ext cx="2743200" cy="2743200"/>
-          </a:xfrm>
-          <a:prstGeom prst="rect">
-            <a:avLst/>
-          </a:prstGeom>
-        </p:spPr>
-      </p:pic>
-      <p:pic>
-        <p:nvPicPr>
-          <p:cNvPr id="3" name="Audio 2">
-            <a:extLst>
-              <a:ext uri="{FF2B5EF4-FFF2-40B4-BE49-F238E27FC236}">
-                <a16:creationId xmlns:a16="http://schemas.microsoft.com/office/drawing/2014/main" id="{45A9F3AE-6696-E91A-F92C-908E51687CC2}"/>
+          <p:cNvPr id="8" name="Audio 7">
+            <a:extLst>
+              <a:ext uri="{FF2B5EF4-FFF2-40B4-BE49-F238E27FC236}">
+                <a16:creationId xmlns:a16="http://schemas.microsoft.com/office/drawing/2014/main" id="{0C473ACD-D29B-311E-4C07-43142E1B8E7E}"/>
               </a:ext>
             </a:extLst>
           </p:cNvPr>
@@ -5167,450 +4723,19 @@
     </p:custDataLst>
     <p:extLst>
       <p:ext uri="{BB962C8B-B14F-4D97-AF65-F5344CB8AC3E}">
-        <p14:creationId xmlns:p14="http://schemas.microsoft.com/office/powerpoint/2010/main" val="2412656309"/>
+        <p14:creationId xmlns:p14="http://schemas.microsoft.com/office/powerpoint/2010/main" val="823763509"/>
       </p:ext>
     </p:extLst>
   </p:cSld>
   <p:clrMapOvr>
     <a:masterClrMapping/>
   </p:clrMapOvr>
-  <mc:AlternateContent xmlns:mc="http://schemas.openxmlformats.org/markup-compatibility/2006" xmlns:p14="http://schemas.microsoft.com/office/powerpoint/2010/main">
-    <mc:Choice Requires="p14">
-      <p:transition spd="slow" p14:dur="2000" advTm="12512"/>
+  <mc:AlternateContent xmlns:mc="http://schemas.openxmlformats.org/markup-compatibility/2006">
+    <mc:Choice xmlns:p14="http://schemas.microsoft.com/office/powerpoint/2010/main" Requires="p14">
+      <p:transition spd="slow" p14:dur="2000" advTm="7104"/>
     </mc:Choice>
-    <mc:Fallback xmlns="">
-      <p:transition spd="slow" advTm="12512"/>
-    </mc:Fallback>
-  </mc:AlternateContent>
-  <p:timing>
-    <p:tnLst>
-      <p:par>
-        <p:cTn id="1" dur="indefinite" restart="never" nodeType="tmRoot">
-          <p:childTnLst>
-            <p:seq concurrent="1" nextAc="seek">
-              <p:cTn id="2" dur="indefinite" nodeType="mainSeq">
-                <p:childTnLst>
-                  <p:par>
-                    <p:cTn id="3" fill="hold">
-                      <p:stCondLst>
-                        <p:cond delay="indefinite"/>
-                        <p:cond evt="onBegin" delay="0">
-                          <p:tn val="2"/>
-                        </p:cond>
-                      </p:stCondLst>
-                      <p:childTnLst>
-                        <p:par>
-                          <p:cTn id="4" fill="hold">
-                            <p:stCondLst>
-                              <p:cond delay="0"/>
-                            </p:stCondLst>
-                            <p:childTnLst>
-                              <p:par>
-                                <p:cTn id="5" presetID="1" presetClass="mediacall" presetSubtype="0" fill="hold" nodeType="afterEffect">
-                                  <p:stCondLst>
-                                    <p:cond delay="0"/>
-                                  </p:stCondLst>
-                                  <p:childTnLst>
-                                    <p:cmd type="call" cmd="playFrom(0.0)">
-                                      <p:cBhvr>
-                                        <p:cTn id="6" dur="1" fill="hold"/>
-                                        <p:tgtEl>
-                                          <p:spTgt spid="3"/>
-                                        </p:tgtEl>
-                                      </p:cBhvr>
-                                    </p:cmd>
-                                  </p:childTnLst>
-                                </p:cTn>
-                              </p:par>
-                            </p:childTnLst>
-                          </p:cTn>
-                        </p:par>
-                      </p:childTnLst>
-                    </p:cTn>
-                  </p:par>
-                  <p:par>
-                    <p:cTn id="7" fill="hold">
-                      <p:stCondLst>
-                        <p:cond delay="indefinite"/>
-                      </p:stCondLst>
-                      <p:childTnLst>
-                        <p:par>
-                          <p:cTn id="8" fill="hold">
-                            <p:stCondLst>
-                              <p:cond delay="0"/>
-                            </p:stCondLst>
-                            <p:childTnLst>
-                              <p:par>
-                                <p:cTn id="9" presetID="1" presetClass="entr" presetSubtype="0" fill="hold" nodeType="clickEffect">
-                                  <p:stCondLst>
-                                    <p:cond delay="0"/>
-                                  </p:stCondLst>
-                                  <p:childTnLst>
-                                    <p:set>
-                                      <p:cBhvr>
-                                        <p:cTn id="10" dur="1" fill="hold">
-                                          <p:stCondLst>
-                                            <p:cond delay="0"/>
-                                          </p:stCondLst>
-                                        </p:cTn>
-                                        <p:tgtEl>
-                                          <p:spTgt spid="5"/>
-                                        </p:tgtEl>
-                                        <p:attrNameLst>
-                                          <p:attrName>style.visibility</p:attrName>
-                                        </p:attrNameLst>
-                                      </p:cBhvr>
-                                      <p:to>
-                                        <p:strVal val="visible"/>
-                                      </p:to>
-                                    </p:set>
-                                  </p:childTnLst>
-                                </p:cTn>
-                              </p:par>
-                              <p:par>
-                                <p:cTn id="11" presetID="1" presetClass="entr" presetSubtype="0" fill="hold" nodeType="withEffect">
-                                  <p:stCondLst>
-                                    <p:cond delay="0"/>
-                                  </p:stCondLst>
-                                  <p:childTnLst>
-                                    <p:set>
-                                      <p:cBhvr>
-                                        <p:cTn id="12" dur="1" fill="hold">
-                                          <p:stCondLst>
-                                            <p:cond delay="0"/>
-                                          </p:stCondLst>
-                                        </p:cTn>
-                                        <p:tgtEl>
-                                          <p:spTgt spid="34"/>
-                                        </p:tgtEl>
-                                        <p:attrNameLst>
-                                          <p:attrName>style.visibility</p:attrName>
-                                        </p:attrNameLst>
-                                      </p:cBhvr>
-                                      <p:to>
-                                        <p:strVal val="visible"/>
-                                      </p:to>
-                                    </p:set>
-                                  </p:childTnLst>
-                                </p:cTn>
-                              </p:par>
-                            </p:childTnLst>
-                          </p:cTn>
-                        </p:par>
-                      </p:childTnLst>
-                    </p:cTn>
-                  </p:par>
-                  <p:par>
-                    <p:cTn id="13" fill="hold">
-                      <p:stCondLst>
-                        <p:cond delay="indefinite"/>
-                      </p:stCondLst>
-                      <p:childTnLst>
-                        <p:par>
-                          <p:cTn id="14" fill="hold">
-                            <p:stCondLst>
-                              <p:cond delay="0"/>
-                            </p:stCondLst>
-                            <p:childTnLst>
-                              <p:par>
-                                <p:cTn id="15" presetID="1" presetClass="entr" presetSubtype="0" fill="hold" nodeType="clickEffect">
-                                  <p:stCondLst>
-                                    <p:cond delay="0"/>
-                                  </p:stCondLst>
-                                  <p:childTnLst>
-                                    <p:set>
-                                      <p:cBhvr>
-                                        <p:cTn id="16" dur="1" fill="hold">
-                                          <p:stCondLst>
-                                            <p:cond delay="0"/>
-                                          </p:stCondLst>
-                                        </p:cTn>
-                                        <p:tgtEl>
-                                          <p:spTgt spid="30"/>
-                                        </p:tgtEl>
-                                        <p:attrNameLst>
-                                          <p:attrName>style.visibility</p:attrName>
-                                        </p:attrNameLst>
-                                      </p:cBhvr>
-                                      <p:to>
-                                        <p:strVal val="visible"/>
-                                      </p:to>
-                                    </p:set>
-                                  </p:childTnLst>
-                                </p:cTn>
-                              </p:par>
-                              <p:par>
-                                <p:cTn id="17" presetID="1" presetClass="entr" presetSubtype="0" fill="hold" nodeType="withEffect">
-                                  <p:stCondLst>
-                                    <p:cond delay="0"/>
-                                  </p:stCondLst>
-                                  <p:childTnLst>
-                                    <p:set>
-                                      <p:cBhvr>
-                                        <p:cTn id="18" dur="1" fill="hold">
-                                          <p:stCondLst>
-                                            <p:cond delay="0"/>
-                                          </p:stCondLst>
-                                        </p:cTn>
-                                        <p:tgtEl>
-                                          <p:spTgt spid="38"/>
-                                        </p:tgtEl>
-                                        <p:attrNameLst>
-                                          <p:attrName>style.visibility</p:attrName>
-                                        </p:attrNameLst>
-                                      </p:cBhvr>
-                                      <p:to>
-                                        <p:strVal val="visible"/>
-                                      </p:to>
-                                    </p:set>
-                                  </p:childTnLst>
-                                </p:cTn>
-                              </p:par>
-                            </p:childTnLst>
-                          </p:cTn>
-                        </p:par>
-                      </p:childTnLst>
-                    </p:cTn>
-                  </p:par>
-                </p:childTnLst>
-              </p:cTn>
-              <p:prevCondLst>
-                <p:cond evt="onPrev" delay="0">
-                  <p:tgtEl>
-                    <p:sldTgt/>
-                  </p:tgtEl>
-                </p:cond>
-              </p:prevCondLst>
-              <p:nextCondLst>
-                <p:cond evt="onNext" delay="0">
-                  <p:tgtEl>
-                    <p:sldTgt/>
-                  </p:tgtEl>
-                </p:cond>
-              </p:nextCondLst>
-            </p:seq>
-            <p:audio isNarration="1">
-              <p:cMediaNode vol="80000" showWhenStopped="0">
-                <p:cTn id="19" fill="hold" display="0">
-                  <p:stCondLst>
-                    <p:cond delay="indefinite"/>
-                  </p:stCondLst>
-                  <p:endCondLst>
-                    <p:cond evt="onStopAudio" delay="0">
-                      <p:tgtEl>
-                        <p:sldTgt/>
-                      </p:tgtEl>
-                    </p:cond>
-                  </p:endCondLst>
-                </p:cTn>
-                <p:tgtEl>
-                  <p:spTgt spid="3"/>
-                </p:tgtEl>
-              </p:cMediaNode>
-            </p:audio>
-          </p:childTnLst>
-        </p:cTn>
-      </p:par>
-    </p:tnLst>
-  </p:timing>
-</p:sld>
-</file>
-
-<file path=ppt/slides/slide4.xml><?xml version="1.0" encoding="utf-8"?>
-<p:sld xmlns:a="http://schemas.openxmlformats.org/drawingml/2006/main" xmlns:r="http://schemas.openxmlformats.org/officeDocument/2006/relationships" xmlns:p="http://schemas.openxmlformats.org/presentationml/2006/main">
-  <p:cSld>
-    <p:spTree>
-      <p:nvGrpSpPr>
-        <p:cNvPr id="1" name="">
-          <a:extLst>
-            <a:ext uri="{FF2B5EF4-FFF2-40B4-BE49-F238E27FC236}">
-              <a16:creationId xmlns:a16="http://schemas.microsoft.com/office/drawing/2014/main" id="{666A4C1B-E3B5-739C-9792-279739B77239}"/>
-            </a:ext>
-          </a:extLst>
-        </p:cNvPr>
-        <p:cNvGrpSpPr/>
-        <p:nvPr/>
-      </p:nvGrpSpPr>
-      <p:grpSpPr>
-        <a:xfrm>
-          <a:off x="0" y="0"/>
-          <a:ext cx="0" cy="0"/>
-          <a:chOff x="0" y="0"/>
-          <a:chExt cx="0" cy="0"/>
-        </a:xfrm>
-      </p:grpSpPr>
-      <p:pic>
-        <p:nvPicPr>
-          <p:cNvPr id="38" name="Picture 37">
-            <a:extLst>
-              <a:ext uri="{FF2B5EF4-FFF2-40B4-BE49-F238E27FC236}">
-                <a16:creationId xmlns:a16="http://schemas.microsoft.com/office/drawing/2014/main" id="{2436DF55-8B1E-5D01-BCCE-773E1789FBC0}"/>
-              </a:ext>
-            </a:extLst>
-          </p:cNvPr>
-          <p:cNvPicPr>
-            <a:picLocks noChangeAspect="1"/>
-          </p:cNvPicPr>
-          <p:nvPr/>
-        </p:nvPicPr>
-        <p:blipFill>
-          <a:blip r:embed="rId6"/>
-          <a:srcRect/>
-          <a:stretch/>
-        </p:blipFill>
-        <p:spPr>
-          <a:xfrm>
-            <a:off x="6605814" y="3757386"/>
-            <a:ext cx="2743200" cy="2743200"/>
-          </a:xfrm>
-          <a:prstGeom prst="rect">
-            <a:avLst/>
-          </a:prstGeom>
-        </p:spPr>
-      </p:pic>
-      <p:pic>
-        <p:nvPicPr>
-          <p:cNvPr id="30" name="Picture 29">
-            <a:extLst>
-              <a:ext uri="{FF2B5EF4-FFF2-40B4-BE49-F238E27FC236}">
-                <a16:creationId xmlns:a16="http://schemas.microsoft.com/office/drawing/2014/main" id="{343AEB6C-9739-1077-DA4A-2E379E3B42E1}"/>
-              </a:ext>
-            </a:extLst>
-          </p:cNvPr>
-          <p:cNvPicPr>
-            <a:picLocks noChangeAspect="1"/>
-          </p:cNvPicPr>
-          <p:nvPr/>
-        </p:nvPicPr>
-        <p:blipFill>
-          <a:blip r:embed="rId7"/>
-          <a:srcRect/>
-          <a:stretch/>
-        </p:blipFill>
-        <p:spPr>
-          <a:xfrm>
-            <a:off x="317500" y="3757386"/>
-            <a:ext cx="2743200" cy="2743200"/>
-          </a:xfrm>
-          <a:prstGeom prst="rect">
-            <a:avLst/>
-          </a:prstGeom>
-        </p:spPr>
-      </p:pic>
-      <p:pic>
-        <p:nvPicPr>
-          <p:cNvPr id="34" name="Picture 33">
-            <a:extLst>
-              <a:ext uri="{FF2B5EF4-FFF2-40B4-BE49-F238E27FC236}">
-                <a16:creationId xmlns:a16="http://schemas.microsoft.com/office/drawing/2014/main" id="{326D68A3-0554-317B-E7D4-90CD40095D4B}"/>
-              </a:ext>
-            </a:extLst>
-          </p:cNvPr>
-          <p:cNvPicPr>
-            <a:picLocks noChangeAspect="1"/>
-          </p:cNvPicPr>
-          <p:nvPr/>
-        </p:nvPicPr>
-        <p:blipFill>
-          <a:blip r:embed="rId6"/>
-          <a:srcRect/>
-          <a:stretch/>
-        </p:blipFill>
-        <p:spPr>
-          <a:xfrm>
-            <a:off x="6605814" y="357415"/>
-            <a:ext cx="2743200" cy="2743200"/>
-          </a:xfrm>
-          <a:prstGeom prst="rect">
-            <a:avLst/>
-          </a:prstGeom>
-        </p:spPr>
-      </p:pic>
-      <p:pic>
-        <p:nvPicPr>
-          <p:cNvPr id="5" name="Picture 4">
-            <a:extLst>
-              <a:ext uri="{FF2B5EF4-FFF2-40B4-BE49-F238E27FC236}">
-                <a16:creationId xmlns:a16="http://schemas.microsoft.com/office/drawing/2014/main" id="{5B22345B-6393-B740-8392-4DC4881F6B86}"/>
-              </a:ext>
-            </a:extLst>
-          </p:cNvPr>
-          <p:cNvPicPr>
-            <a:picLocks noChangeAspect="1"/>
-          </p:cNvPicPr>
-          <p:nvPr/>
-        </p:nvPicPr>
-        <p:blipFill>
-          <a:blip r:embed="rId7"/>
-          <a:srcRect/>
-          <a:stretch/>
-        </p:blipFill>
-        <p:spPr>
-          <a:xfrm>
-            <a:off x="317500" y="357415"/>
-            <a:ext cx="2743200" cy="2743200"/>
-          </a:xfrm>
-          <a:prstGeom prst="rect">
-            <a:avLst/>
-          </a:prstGeom>
-        </p:spPr>
-      </p:pic>
-      <p:pic>
-        <p:nvPicPr>
-          <p:cNvPr id="8" name="Audio 7">
-            <a:extLst>
-              <a:ext uri="{FF2B5EF4-FFF2-40B4-BE49-F238E27FC236}">
-                <a16:creationId xmlns:a16="http://schemas.microsoft.com/office/drawing/2014/main" id="{EA951AA9-80D6-0FF8-6D19-C4E41CBDB914}"/>
-              </a:ext>
-            </a:extLst>
-          </p:cNvPr>
-          <p:cNvPicPr>
-            <a:picLocks noChangeAspect="1"/>
-          </p:cNvPicPr>
-          <p:nvPr>
-            <a:audioFile r:link="rId3"/>
-            <p:extLst>
-              <p:ext uri="{DAA4B4D4-6D71-4841-9C94-3DE7FCFB9230}">
-                <p14:media xmlns:p14="http://schemas.microsoft.com/office/powerpoint/2010/main" r:embed="rId2"/>
-              </p:ext>
-            </p:extLst>
-          </p:nvPr>
-        </p:nvPicPr>
-        <p:blipFill>
-          <a:blip r:embed="rId8"/>
-          <a:stretch>
-            <a:fillRect/>
-          </a:stretch>
-        </p:blipFill>
-        <p:spPr>
-          <a:xfrm>
-            <a:off x="11226800" y="5892800"/>
-            <a:ext cx="812800" cy="812800"/>
-          </a:xfrm>
-          <a:prstGeom prst="rect">
-            <a:avLst/>
-          </a:prstGeom>
-        </p:spPr>
-      </p:pic>
-    </p:spTree>
-    <p:custDataLst>
-      <p:tags r:id="rId1"/>
-    </p:custDataLst>
-    <p:extLst>
-      <p:ext uri="{BB962C8B-B14F-4D97-AF65-F5344CB8AC3E}">
-        <p14:creationId xmlns:p14="http://schemas.microsoft.com/office/powerpoint/2010/main" val="2867135856"/>
-      </p:ext>
-    </p:extLst>
-  </p:cSld>
-  <p:clrMapOvr>
-    <a:masterClrMapping/>
-  </p:clrMapOvr>
-  <mc:AlternateContent xmlns:mc="http://schemas.openxmlformats.org/markup-compatibility/2006" xmlns:p14="http://schemas.microsoft.com/office/powerpoint/2010/main">
-    <mc:Choice Requires="p14">
-      <p:transition spd="slow" p14:dur="2000" advTm="12736"/>
-    </mc:Choice>
-    <mc:Fallback xmlns="">
-      <p:transition spd="slow" advTm="12736"/>
+    <mc:Fallback>
+      <p:transition spd="slow" advTm="7104"/>
     </mc:Fallback>
   </mc:AlternateContent>
   <p:timing>
@@ -5659,150 +4784,6 @@
                       </p:childTnLst>
                     </p:cTn>
                   </p:par>
-                  <p:par>
-                    <p:cTn id="7" fill="hold">
-                      <p:stCondLst>
-                        <p:cond delay="indefinite"/>
-                      </p:stCondLst>
-                      <p:childTnLst>
-                        <p:par>
-                          <p:cTn id="8" fill="hold">
-                            <p:stCondLst>
-                              <p:cond delay="0"/>
-                            </p:stCondLst>
-                            <p:childTnLst>
-                              <p:par>
-                                <p:cTn id="9" presetID="1" presetClass="entr" presetSubtype="0" fill="hold" nodeType="clickEffect">
-                                  <p:stCondLst>
-                                    <p:cond delay="0"/>
-                                  </p:stCondLst>
-                                  <p:childTnLst>
-                                    <p:set>
-                                      <p:cBhvr>
-                                        <p:cTn id="10" dur="1" fill="hold">
-                                          <p:stCondLst>
-                                            <p:cond delay="0"/>
-                                          </p:stCondLst>
-                                        </p:cTn>
-                                        <p:tgtEl>
-                                          <p:spTgt spid="30"/>
-                                        </p:tgtEl>
-                                        <p:attrNameLst>
-                                          <p:attrName>style.visibility</p:attrName>
-                                        </p:attrNameLst>
-                                      </p:cBhvr>
-                                      <p:to>
-                                        <p:strVal val="visible"/>
-                                      </p:to>
-                                    </p:set>
-                                  </p:childTnLst>
-                                </p:cTn>
-                              </p:par>
-                              <p:par>
-                                <p:cTn id="11" presetID="1" presetClass="entr" presetSubtype="0" fill="hold" nodeType="withEffect">
-                                  <p:stCondLst>
-                                    <p:cond delay="0"/>
-                                  </p:stCondLst>
-                                  <p:childTnLst>
-                                    <p:set>
-                                      <p:cBhvr>
-                                        <p:cTn id="12" dur="1" fill="hold">
-                                          <p:stCondLst>
-                                            <p:cond delay="0"/>
-                                          </p:stCondLst>
-                                        </p:cTn>
-                                        <p:tgtEl>
-                                          <p:spTgt spid="5"/>
-                                        </p:tgtEl>
-                                        <p:attrNameLst>
-                                          <p:attrName>style.visibility</p:attrName>
-                                        </p:attrNameLst>
-                                      </p:cBhvr>
-                                      <p:to>
-                                        <p:strVal val="visible"/>
-                                      </p:to>
-                                    </p:set>
-                                  </p:childTnLst>
-                                </p:cTn>
-                              </p:par>
-                            </p:childTnLst>
-                          </p:cTn>
-                        </p:par>
-                      </p:childTnLst>
-                    </p:cTn>
-                  </p:par>
-                  <p:par>
-                    <p:cTn id="13" fill="hold">
-                      <p:stCondLst>
-                        <p:cond delay="indefinite"/>
-                      </p:stCondLst>
-                      <p:childTnLst>
-                        <p:par>
-                          <p:cTn id="14" fill="hold">
-                            <p:stCondLst>
-                              <p:cond delay="0"/>
-                            </p:stCondLst>
-                            <p:childTnLst>
-                              <p:par>
-                                <p:cTn id="15" presetID="1" presetClass="entr" presetSubtype="0" fill="hold" nodeType="clickEffect">
-                                  <p:stCondLst>
-                                    <p:cond delay="0"/>
-                                  </p:stCondLst>
-                                  <p:childTnLst>
-                                    <p:set>
-                                      <p:cBhvr>
-                                        <p:cTn id="16" dur="1" fill="hold">
-                                          <p:stCondLst>
-                                            <p:cond delay="0"/>
-                                          </p:stCondLst>
-                                        </p:cTn>
-                                        <p:tgtEl>
-                                          <p:spTgt spid="34"/>
-                                        </p:tgtEl>
-                                        <p:attrNameLst>
-                                          <p:attrName>style.visibility</p:attrName>
-                                        </p:attrNameLst>
-                                      </p:cBhvr>
-                                      <p:to>
-                                        <p:strVal val="visible"/>
-                                      </p:to>
-                                    </p:set>
-                                  </p:childTnLst>
-                                </p:cTn>
-                              </p:par>
-                              <p:par>
-                                <p:cTn id="17" presetID="1" presetClass="entr" presetSubtype="0" fill="hold" nodeType="withEffect">
-                                  <p:stCondLst>
-                                    <p:cond delay="0"/>
-                                  </p:stCondLst>
-                                  <p:childTnLst>
-                                    <p:set>
-                                      <p:cBhvr>
-                                        <p:cTn id="18" dur="1" fill="hold">
-                                          <p:stCondLst>
-                                            <p:cond delay="0"/>
-                                          </p:stCondLst>
-                                        </p:cTn>
-                                        <p:tgtEl>
-                                          <p:spTgt spid="38"/>
-                                        </p:tgtEl>
-                                        <p:attrNameLst>
-                                          <p:attrName>style.visibility</p:attrName>
-                                        </p:attrNameLst>
-                                      </p:cBhvr>
-                                      <p:to>
-                                        <p:strVal val="visible"/>
-                                      </p:to>
-                                    </p:set>
-                                  </p:childTnLst>
-                                </p:cTn>
-                              </p:par>
-                            </p:childTnLst>
-                          </p:cTn>
-                        </p:par>
-                      </p:childTnLst>
-                    </p:cTn>
-                  </p:par>
                 </p:childTnLst>
               </p:cTn>
               <p:prevCondLst>
@@ -5822,7 +4803,7 @@
             </p:seq>
             <p:audio isNarration="1">
               <p:cMediaNode vol="80000" showWhenStopped="0">
-                <p:cTn id="19" fill="hold" display="0">
+                <p:cTn id="7" fill="hold" display="0">
                   <p:stCondLst>
                     <p:cond delay="indefinite"/>
                   </p:stCondLst>
@@ -5847,7 +4828,7 @@
 </p:sld>
 </file>
 
-<file path=ppt/slides/slide5.xml><?xml version="1.0" encoding="utf-8"?>
+<file path=ppt/slides/slide4.xml><?xml version="1.0" encoding="utf-8"?>
 <p:sld xmlns:a="http://schemas.openxmlformats.org/drawingml/2006/main" xmlns:r="http://schemas.openxmlformats.org/officeDocument/2006/relationships" xmlns:p="http://schemas.openxmlformats.org/presentationml/2006/main">
   <p:cSld>
     <p:spTree>
@@ -6018,7 +4999,7 @@
           <a:solidFill>
             <a:srgbClr val="FFFFFF"/>
           </a:solidFill>
-          <a:ln w="76200" cap="sq">
+          <a:ln w="38100" cap="sq">
             <a:solidFill>
               <a:srgbClr val="292929"/>
             </a:solidFill>
@@ -6071,7 +5052,7 @@
           <a:solidFill>
             <a:srgbClr val="FFFFFF"/>
           </a:solidFill>
-          <a:ln w="76200" cap="sq">
+          <a:ln w="38100" cap="sq">
             <a:solidFill>
               <a:srgbClr val="292929"/>
             </a:solidFill>
@@ -6124,7 +5105,7 @@
           <a:solidFill>
             <a:srgbClr val="FFFFFF"/>
           </a:solidFill>
-          <a:ln w="76200" cap="sq">
+          <a:ln w="38100" cap="sq">
             <a:solidFill>
               <a:srgbClr val="292929"/>
             </a:solidFill>
@@ -6177,7 +5158,7 @@
           <a:solidFill>
             <a:srgbClr val="FFFFFF"/>
           </a:solidFill>
-          <a:ln w="76200" cap="sq">
+          <a:ln w="38100" cap="sq">
             <a:solidFill>
               <a:srgbClr val="292929"/>
             </a:solidFill>
@@ -6230,7 +5211,7 @@
           <a:solidFill>
             <a:srgbClr val="FFFFFF"/>
           </a:solidFill>
-          <a:ln w="76200" cap="sq">
+          <a:ln w="38100" cap="sq">
             <a:solidFill>
               <a:srgbClr val="292929"/>
             </a:solidFill>
@@ -6283,7 +5264,7 @@
           <a:solidFill>
             <a:srgbClr val="FFFFFF"/>
           </a:solidFill>
-          <a:ln w="76200" cap="sq">
+          <a:ln w="38100" cap="sq">
             <a:solidFill>
               <a:srgbClr val="292929"/>
             </a:solidFill>
@@ -6336,7 +5317,7 @@
           <a:solidFill>
             <a:srgbClr val="FFFFFF"/>
           </a:solidFill>
-          <a:ln w="76200" cap="sq">
+          <a:ln w="38100" cap="sq">
             <a:solidFill>
               <a:srgbClr val="292929"/>
             </a:solidFill>
@@ -6389,7 +5370,7 @@
           <a:solidFill>
             <a:srgbClr val="FFFFFF"/>
           </a:solidFill>
-          <a:ln w="76200" cap="sq">
+          <a:ln w="38100" cap="sq">
             <a:solidFill>
               <a:srgbClr val="292929"/>
             </a:solidFill>
@@ -6836,10 +5817,10 @@
       </p:pic>
       <p:pic>
         <p:nvPicPr>
-          <p:cNvPr id="12" name="Audio 11">
-            <a:extLst>
-              <a:ext uri="{FF2B5EF4-FFF2-40B4-BE49-F238E27FC236}">
-                <a16:creationId xmlns:a16="http://schemas.microsoft.com/office/drawing/2014/main" id="{7634DE34-3442-BD6F-7874-1B6D047512BD}"/>
+          <p:cNvPr id="23" name="Audio 22">
+            <a:extLst>
+              <a:ext uri="{FF2B5EF4-FFF2-40B4-BE49-F238E27FC236}">
+                <a16:creationId xmlns:a16="http://schemas.microsoft.com/office/drawing/2014/main" id="{755B6CD8-C1BE-C96D-9C33-FEF4984F644A}"/>
               </a:ext>
             </a:extLst>
           </p:cNvPr>
@@ -6881,12 +5862,12 @@
   <p:clrMapOvr>
     <a:masterClrMapping/>
   </p:clrMapOvr>
-  <mc:AlternateContent xmlns:mc="http://schemas.openxmlformats.org/markup-compatibility/2006" xmlns:p14="http://schemas.microsoft.com/office/powerpoint/2010/main">
-    <mc:Choice Requires="p14">
-      <p:transition spd="slow" p14:dur="2000" advTm="7584"/>
+  <mc:AlternateContent xmlns:mc="http://schemas.openxmlformats.org/markup-compatibility/2006">
+    <mc:Choice xmlns:p14="http://schemas.microsoft.com/office/powerpoint/2010/main" Requires="p14">
+      <p:transition spd="slow" p14:dur="2000" advTm="7658"/>
     </mc:Choice>
-    <mc:Fallback xmlns="">
-      <p:transition spd="slow" advTm="7584"/>
+    <mc:Fallback>
+      <p:transition spd="slow" advTm="7658"/>
     </mc:Fallback>
   </mc:AlternateContent>
   <p:timing>
@@ -6922,7 +5903,7 @@
                                       <p:cBhvr>
                                         <p:cTn id="6" dur="1" fill="hold"/>
                                         <p:tgtEl>
-                                          <p:spTgt spid="12"/>
+                                          <p:spTgt spid="23"/>
                                         </p:tgtEl>
                                       </p:cBhvr>
                                     </p:cmd>
@@ -6967,7 +5948,7 @@
                   </p:endCondLst>
                 </p:cTn>
                 <p:tgtEl>
-                  <p:spTgt spid="12"/>
+                  <p:spTgt spid="23"/>
                 </p:tgtEl>
               </p:cMediaNode>
             </p:audio>
@@ -6987,7 +5968,7 @@
 
 <file path=ppt/tags/tag2.xml><?xml version="1.0" encoding="utf-8"?>
 <p:tagLst xmlns:a="http://schemas.openxmlformats.org/drawingml/2006/main" xmlns:r="http://schemas.openxmlformats.org/officeDocument/2006/relationships" xmlns:p="http://schemas.openxmlformats.org/presentationml/2006/main">
-  <p:tag name="TIMING" val="|4.1|5.9"/>
+  <p:tag name="TIMING" val="|2.4|6.2"/>
 </p:tagLst>
 </file>
 

</xml_diff>